<commit_message>
fix some typeset problems and add more
</commit_message>
<xml_diff>
--- a/figs/conceptual_model.pptx
+++ b/figs/conceptual_model.pptx
@@ -104,6 +104,11 @@
       </a:defRPr>
     </a:lvl9pPr>
   </p:defaultTextStyle>
+  <p:extLst>
+    <p:ext uri="{EFAFB233-063F-42B5-8137-9DF3F51BA10A}">
+      <p15:sldGuideLst xmlns:p15="http://schemas.microsoft.com/office/powerpoint/2012/main"/>
+    </p:ext>
+  </p:extLst>
 </p:presentation>
 </file>
 
@@ -152,7 +157,6 @@
               <a:rPr lang="en-US"/>
               <a:t>Click to edit Master title style</a:t>
             </a:r>
-            <a:endParaRPr lang="en-US"/>
           </a:p>
         </p:txBody>
       </p:sp>
@@ -217,7 +221,6 @@
               <a:rPr lang="en-US"/>
               <a:t>Click to edit Master subtitle style</a:t>
             </a:r>
-            <a:endParaRPr lang="en-US"/>
           </a:p>
         </p:txBody>
       </p:sp>
@@ -238,7 +241,7 @@
           <a:p>
             <a:fld id="{7E54850E-9500-4147-9842-A263B6E275BD}" type="datetimeFigureOut">
               <a:rPr lang="en-US" smtClean="0"/>
-              <a:t>8/13/2019</a:t>
+              <a:t>8/14/2019</a:t>
             </a:fld>
             <a:endParaRPr lang="en-US"/>
           </a:p>
@@ -335,7 +338,6 @@
               <a:rPr lang="en-US"/>
               <a:t>Click to edit Master title style</a:t>
             </a:r>
-            <a:endParaRPr lang="en-US"/>
           </a:p>
         </p:txBody>
       </p:sp>
@@ -387,7 +389,6 @@
               <a:rPr lang="en-US"/>
               <a:t>Fifth level</a:t>
             </a:r>
-            <a:endParaRPr lang="en-US"/>
           </a:p>
         </p:txBody>
       </p:sp>
@@ -408,7 +409,7 @@
           <a:p>
             <a:fld id="{7E54850E-9500-4147-9842-A263B6E275BD}" type="datetimeFigureOut">
               <a:rPr lang="en-US" smtClean="0"/>
-              <a:t>8/13/2019</a:t>
+              <a:t>8/14/2019</a:t>
             </a:fld>
             <a:endParaRPr lang="en-US"/>
           </a:p>
@@ -510,7 +511,6 @@
               <a:rPr lang="en-US"/>
               <a:t>Click to edit Master title style</a:t>
             </a:r>
-            <a:endParaRPr lang="en-US"/>
           </a:p>
         </p:txBody>
       </p:sp>
@@ -567,7 +567,6 @@
               <a:rPr lang="en-US"/>
               <a:t>Fifth level</a:t>
             </a:r>
-            <a:endParaRPr lang="en-US"/>
           </a:p>
         </p:txBody>
       </p:sp>
@@ -588,7 +587,7 @@
           <a:p>
             <a:fld id="{7E54850E-9500-4147-9842-A263B6E275BD}" type="datetimeFigureOut">
               <a:rPr lang="en-US" smtClean="0"/>
-              <a:t>8/13/2019</a:t>
+              <a:t>8/14/2019</a:t>
             </a:fld>
             <a:endParaRPr lang="en-US"/>
           </a:p>
@@ -685,7 +684,6 @@
               <a:rPr lang="en-US"/>
               <a:t>Click to edit Master title style</a:t>
             </a:r>
-            <a:endParaRPr lang="en-US"/>
           </a:p>
         </p:txBody>
       </p:sp>
@@ -737,7 +735,6 @@
               <a:rPr lang="en-US"/>
               <a:t>Fifth level</a:t>
             </a:r>
-            <a:endParaRPr lang="en-US"/>
           </a:p>
         </p:txBody>
       </p:sp>
@@ -758,7 +755,7 @@
           <a:p>
             <a:fld id="{7E54850E-9500-4147-9842-A263B6E275BD}" type="datetimeFigureOut">
               <a:rPr lang="en-US" smtClean="0"/>
-              <a:t>8/13/2019</a:t>
+              <a:t>8/14/2019</a:t>
             </a:fld>
             <a:endParaRPr lang="en-US"/>
           </a:p>
@@ -864,7 +861,6 @@
               <a:rPr lang="en-US"/>
               <a:t>Click to edit Master title style</a:t>
             </a:r>
-            <a:endParaRPr lang="en-US"/>
           </a:p>
         </p:txBody>
       </p:sp>
@@ -1004,7 +1000,7 @@
           <a:p>
             <a:fld id="{7E54850E-9500-4147-9842-A263B6E275BD}" type="datetimeFigureOut">
               <a:rPr lang="en-US" smtClean="0"/>
-              <a:t>8/13/2019</a:t>
+              <a:t>8/14/2019</a:t>
             </a:fld>
             <a:endParaRPr lang="en-US"/>
           </a:p>
@@ -1101,7 +1097,6 @@
               <a:rPr lang="en-US"/>
               <a:t>Click to edit Master title style</a:t>
             </a:r>
-            <a:endParaRPr lang="en-US"/>
           </a:p>
         </p:txBody>
       </p:sp>
@@ -1158,7 +1153,6 @@
               <a:rPr lang="en-US"/>
               <a:t>Fifth level</a:t>
             </a:r>
-            <a:endParaRPr lang="en-US"/>
           </a:p>
         </p:txBody>
       </p:sp>
@@ -1215,7 +1209,6 @@
               <a:rPr lang="en-US"/>
               <a:t>Fifth level</a:t>
             </a:r>
-            <a:endParaRPr lang="en-US"/>
           </a:p>
         </p:txBody>
       </p:sp>
@@ -1236,7 +1229,7 @@
           <a:p>
             <a:fld id="{7E54850E-9500-4147-9842-A263B6E275BD}" type="datetimeFigureOut">
               <a:rPr lang="en-US" smtClean="0"/>
-              <a:t>8/13/2019</a:t>
+              <a:t>8/14/2019</a:t>
             </a:fld>
             <a:endParaRPr lang="en-US"/>
           </a:p>
@@ -1338,7 +1331,6 @@
               <a:rPr lang="en-US"/>
               <a:t>Click to edit Master title style</a:t>
             </a:r>
-            <a:endParaRPr lang="en-US"/>
           </a:p>
         </p:txBody>
       </p:sp>
@@ -1460,7 +1452,6 @@
               <a:rPr lang="en-US"/>
               <a:t>Fifth level</a:t>
             </a:r>
-            <a:endParaRPr lang="en-US"/>
           </a:p>
         </p:txBody>
       </p:sp>
@@ -1582,7 +1573,6 @@
               <a:rPr lang="en-US"/>
               <a:t>Fifth level</a:t>
             </a:r>
-            <a:endParaRPr lang="en-US"/>
           </a:p>
         </p:txBody>
       </p:sp>
@@ -1603,7 +1593,7 @@
           <a:p>
             <a:fld id="{7E54850E-9500-4147-9842-A263B6E275BD}" type="datetimeFigureOut">
               <a:rPr lang="en-US" smtClean="0"/>
-              <a:t>8/13/2019</a:t>
+              <a:t>8/14/2019</a:t>
             </a:fld>
             <a:endParaRPr lang="en-US"/>
           </a:p>
@@ -1700,7 +1690,6 @@
               <a:rPr lang="en-US"/>
               <a:t>Click to edit Master title style</a:t>
             </a:r>
-            <a:endParaRPr lang="en-US"/>
           </a:p>
         </p:txBody>
       </p:sp>
@@ -1721,7 +1710,7 @@
           <a:p>
             <a:fld id="{7E54850E-9500-4147-9842-A263B6E275BD}" type="datetimeFigureOut">
               <a:rPr lang="en-US" smtClean="0"/>
-              <a:t>8/13/2019</a:t>
+              <a:t>8/14/2019</a:t>
             </a:fld>
             <a:endParaRPr lang="en-US"/>
           </a:p>
@@ -1816,7 +1805,7 @@
           <a:p>
             <a:fld id="{7E54850E-9500-4147-9842-A263B6E275BD}" type="datetimeFigureOut">
               <a:rPr lang="en-US" smtClean="0"/>
-              <a:t>8/13/2019</a:t>
+              <a:t>8/14/2019</a:t>
             </a:fld>
             <a:endParaRPr lang="en-US"/>
           </a:p>
@@ -1922,7 +1911,6 @@
               <a:rPr lang="en-US"/>
               <a:t>Click to edit Master title style</a:t>
             </a:r>
-            <a:endParaRPr lang="en-US"/>
           </a:p>
         </p:txBody>
       </p:sp>
@@ -2007,7 +1995,6 @@
               <a:rPr lang="en-US"/>
               <a:t>Fifth level</a:t>
             </a:r>
-            <a:endParaRPr lang="en-US"/>
           </a:p>
         </p:txBody>
       </p:sp>
@@ -2093,7 +2080,7 @@
           <a:p>
             <a:fld id="{7E54850E-9500-4147-9842-A263B6E275BD}" type="datetimeFigureOut">
               <a:rPr lang="en-US" smtClean="0"/>
-              <a:t>8/13/2019</a:t>
+              <a:t>8/14/2019</a:t>
             </a:fld>
             <a:endParaRPr lang="en-US"/>
           </a:p>
@@ -2199,7 +2186,6 @@
               <a:rPr lang="en-US"/>
               <a:t>Click to edit Master title style</a:t>
             </a:r>
-            <a:endParaRPr lang="en-US"/>
           </a:p>
         </p:txBody>
       </p:sp>
@@ -2346,7 +2332,7 @@
           <a:p>
             <a:fld id="{7E54850E-9500-4147-9842-A263B6E275BD}" type="datetimeFigureOut">
               <a:rPr lang="en-US" smtClean="0"/>
-              <a:t>8/13/2019</a:t>
+              <a:t>8/14/2019</a:t>
             </a:fld>
             <a:endParaRPr lang="en-US"/>
           </a:p>
@@ -2458,7 +2444,6 @@
               <a:rPr lang="en-US"/>
               <a:t>Click to edit Master title style</a:t>
             </a:r>
-            <a:endParaRPr lang="en-US"/>
           </a:p>
         </p:txBody>
       </p:sp>
@@ -2520,7 +2505,6 @@
               <a:rPr lang="en-US"/>
               <a:t>Fifth level</a:t>
             </a:r>
-            <a:endParaRPr lang="en-US"/>
           </a:p>
         </p:txBody>
       </p:sp>
@@ -2559,7 +2543,7 @@
           <a:p>
             <a:fld id="{7E54850E-9500-4147-9842-A263B6E275BD}" type="datetimeFigureOut">
               <a:rPr lang="en-US" smtClean="0"/>
-              <a:t>8/13/2019</a:t>
+              <a:t>8/14/2019</a:t>
             </a:fld>
             <a:endParaRPr lang="en-US"/>
           </a:p>
@@ -3059,7 +3043,7 @@
         <p:spPr>
           <a:xfrm>
             <a:off x="3026664" y="317090"/>
-            <a:ext cx="2706624" cy="1021556"/>
+            <a:ext cx="2825496" cy="1021556"/>
           </a:xfrm>
           <a:prstGeom prst="roundRect">
             <a:avLst/>
@@ -3126,7 +3110,7 @@
         <p:spPr>
           <a:xfrm>
             <a:off x="3026664" y="3145711"/>
-            <a:ext cx="2706624" cy="646331"/>
+            <a:ext cx="2825496" cy="646331"/>
           </a:xfrm>
           <a:prstGeom prst="rect">
             <a:avLst/>
@@ -3180,7 +3164,7 @@
         <p:spPr>
           <a:xfrm>
             <a:off x="3017520" y="5155529"/>
-            <a:ext cx="2715768" cy="1477328"/>
+            <a:ext cx="2834640" cy="1477328"/>
           </a:xfrm>
           <a:prstGeom prst="rect">
             <a:avLst/>
@@ -3269,7 +3253,7 @@
         <p:spPr>
           <a:xfrm>
             <a:off x="3017520" y="4012120"/>
-            <a:ext cx="2706624" cy="923330"/>
+            <a:ext cx="2834640" cy="923330"/>
           </a:xfrm>
           <a:prstGeom prst="rect">
             <a:avLst/>
@@ -3336,7 +3320,7 @@
         <p:spPr>
           <a:xfrm>
             <a:off x="3026664" y="1460498"/>
-            <a:ext cx="2706624" cy="1021556"/>
+            <a:ext cx="2825496" cy="1021556"/>
           </a:xfrm>
           <a:prstGeom prst="roundRect">
             <a:avLst/>
@@ -3378,6 +3362,30 @@
               </a:rPr>
               <a:t>Cumulative driving time</a:t>
             </a:r>
+          </a:p>
+          <a:p>
+            <a:pPr marL="285750" indent="-285750">
+              <a:buFont typeface="Arial" panose="020B0604020202020204" pitchFamily="34" charset="0"/>
+              <a:buChar char="•"/>
+            </a:pPr>
+            <a:r>
+              <a:rPr lang="en-US">
+                <a:latin typeface="Times New Roman" panose="02020603050405020304" pitchFamily="18" charset="0"/>
+                <a:cs typeface="Times New Roman" panose="02020603050405020304" pitchFamily="18" charset="0"/>
+              </a:rPr>
+              <a:t>R</a:t>
+            </a:r>
+            <a:r>
+              <a:rPr lang="en-US" altLang="zh-CN">
+                <a:latin typeface="Times New Roman" panose="02020603050405020304" pitchFamily="18" charset="0"/>
+                <a:cs typeface="Times New Roman" panose="02020603050405020304" pitchFamily="18" charset="0"/>
+              </a:rPr>
+              <a:t>est time</a:t>
+            </a:r>
+            <a:endParaRPr lang="en-US" dirty="0">
+              <a:latin typeface="Times New Roman" panose="02020603050405020304" pitchFamily="18" charset="0"/>
+              <a:cs typeface="Times New Roman" panose="02020603050405020304" pitchFamily="18" charset="0"/>
+            </a:endParaRPr>
           </a:p>
         </p:txBody>
       </p:sp>
@@ -3644,8 +3652,8 @@
         </p:nvCxnSpPr>
         <p:spPr>
           <a:xfrm>
-            <a:off x="5733288" y="827868"/>
-            <a:ext cx="3401568" cy="2575486"/>
+            <a:off x="5852160" y="827868"/>
+            <a:ext cx="3282696" cy="2575486"/>
           </a:xfrm>
           <a:prstGeom prst="straightConnector1">
             <a:avLst/>
@@ -3680,8 +3688,8 @@
         </p:nvCxnSpPr>
         <p:spPr>
           <a:xfrm>
-            <a:off x="5733288" y="1971276"/>
-            <a:ext cx="3401568" cy="1432078"/>
+            <a:off x="5852160" y="1971276"/>
+            <a:ext cx="3282696" cy="1432078"/>
           </a:xfrm>
           <a:prstGeom prst="straightConnector1">
             <a:avLst/>
@@ -3716,8 +3724,8 @@
         </p:nvCxnSpPr>
         <p:spPr>
           <a:xfrm flipV="1">
-            <a:off x="5733288" y="3403354"/>
-            <a:ext cx="3401568" cy="65523"/>
+            <a:off x="5852160" y="3403354"/>
+            <a:ext cx="3282696" cy="65523"/>
           </a:xfrm>
           <a:prstGeom prst="straightConnector1">
             <a:avLst/>
@@ -3752,8 +3760,8 @@
         </p:nvCxnSpPr>
         <p:spPr>
           <a:xfrm flipV="1">
-            <a:off x="5724144" y="3403354"/>
-            <a:ext cx="3410712" cy="1070431"/>
+            <a:off x="5852160" y="3403354"/>
+            <a:ext cx="3282696" cy="1070431"/>
           </a:xfrm>
           <a:prstGeom prst="straightConnector1">
             <a:avLst/>
@@ -3788,8 +3796,8 @@
         </p:nvCxnSpPr>
         <p:spPr>
           <a:xfrm flipV="1">
-            <a:off x="5733288" y="3403354"/>
-            <a:ext cx="3401568" cy="2490839"/>
+            <a:off x="5852160" y="3403354"/>
+            <a:ext cx="3282696" cy="2490839"/>
           </a:xfrm>
           <a:prstGeom prst="straightConnector1">
             <a:avLst/>

</xml_diff>